<commit_message>
Sprint 3 les dossier plus présentation
Présentation toujours au nom de la clémence d'auguste
</commit_message>
<xml_diff>
--- a/1-Documentations/C - Rendu Sprint 3/Conseil 7.pptx
+++ b/1-Documentations/C - Rendu Sprint 3/Conseil 7.pptx
@@ -218,7 +218,7 @@
       </p14:sectionLst>
     </p:ext>
     <p:ext uri="{EFAFB233-063F-42B5-8137-9DF3F51BA10A}">
-      <p15:sldGuideLst xmlns="" xmlns:p15="http://schemas.microsoft.com/office/powerpoint/2012/main">
+      <p15:sldGuideLst xmlns:p15="http://schemas.microsoft.com/office/powerpoint/2012/main" xmlns="">
         <p15:guide id="1" orient="horz" pos="2160">
           <p15:clr>
             <a:srgbClr val="A4A3A4"/>
@@ -18772,13 +18772,7 @@
               <a:rPr lang="fr-FR" sz="1800" dirty="0" smtClean="0">
                 <a:latin typeface="Ubuntu" pitchFamily="34" charset="0"/>
               </a:rPr>
-              <a:t>/</a:t>
-            </a:r>
-            <a:r>
-              <a:rPr lang="fr-FR" sz="1800" dirty="0" smtClean="0">
-                <a:latin typeface="Ubuntu" pitchFamily="34" charset="0"/>
-              </a:rPr>
-              <a:t>18</a:t>
+              <a:t>/18</a:t>
             </a:r>
             <a:endParaRPr lang="fr-FR" sz="1800" dirty="0">
               <a:latin typeface="Ubuntu" pitchFamily="34" charset="0"/>
@@ -19324,13 +19318,7 @@
               <a:rPr lang="fr-FR" sz="1800" dirty="0" smtClean="0">
                 <a:latin typeface="Ubuntu" pitchFamily="34" charset="0"/>
               </a:rPr>
-              <a:t>/</a:t>
-            </a:r>
-            <a:r>
-              <a:rPr lang="fr-FR" sz="1800" dirty="0" smtClean="0">
-                <a:latin typeface="Ubuntu" pitchFamily="34" charset="0"/>
-              </a:rPr>
-              <a:t>18</a:t>
+              <a:t>/18</a:t>
             </a:r>
             <a:endParaRPr lang="fr-FR" sz="1800" dirty="0">
               <a:latin typeface="Ubuntu" pitchFamily="34" charset="0"/>
@@ -19876,13 +19864,7 @@
               <a:rPr lang="fr-FR" sz="1800" dirty="0" smtClean="0">
                 <a:latin typeface="Ubuntu" pitchFamily="34" charset="0"/>
               </a:rPr>
-              <a:t>/</a:t>
-            </a:r>
-            <a:r>
-              <a:rPr lang="fr-FR" sz="1800" dirty="0" smtClean="0">
-                <a:latin typeface="Ubuntu" pitchFamily="34" charset="0"/>
-              </a:rPr>
-              <a:t>18</a:t>
+              <a:t>/18</a:t>
             </a:r>
             <a:endParaRPr lang="fr-FR" sz="1800" dirty="0">
               <a:latin typeface="Ubuntu" pitchFamily="34" charset="0"/>
@@ -20428,13 +20410,7 @@
               <a:rPr lang="fr-FR" sz="1800" dirty="0" smtClean="0">
                 <a:latin typeface="Ubuntu" pitchFamily="34" charset="0"/>
               </a:rPr>
-              <a:t>/</a:t>
-            </a:r>
-            <a:r>
-              <a:rPr lang="fr-FR" sz="1800" dirty="0" smtClean="0">
-                <a:latin typeface="Ubuntu" pitchFamily="34" charset="0"/>
-              </a:rPr>
-              <a:t>18</a:t>
+              <a:t>/18</a:t>
             </a:r>
             <a:endParaRPr lang="fr-FR" sz="1800" dirty="0">
               <a:latin typeface="Ubuntu" pitchFamily="34" charset="0"/>
@@ -20980,13 +20956,7 @@
               <a:rPr lang="fr-FR" sz="1800" dirty="0" smtClean="0">
                 <a:latin typeface="Ubuntu" pitchFamily="34" charset="0"/>
               </a:rPr>
-              <a:t>/</a:t>
-            </a:r>
-            <a:r>
-              <a:rPr lang="fr-FR" sz="1800" dirty="0" smtClean="0">
-                <a:latin typeface="Ubuntu" pitchFamily="34" charset="0"/>
-              </a:rPr>
-              <a:t>18</a:t>
+              <a:t>/18</a:t>
             </a:r>
             <a:endParaRPr lang="fr-FR" sz="1800" dirty="0">
               <a:latin typeface="Ubuntu" pitchFamily="34" charset="0"/>
@@ -21842,7 +21812,7 @@
           <a:p>
             <a:pPr>
               <a:lnSpc>
-                <a:spcPct val="200000"/>
+                <a:spcPct val="150000"/>
               </a:lnSpc>
             </a:pPr>
             <a:r>
@@ -21853,7 +21823,7 @@
           <a:p>
             <a:pPr>
               <a:lnSpc>
-                <a:spcPct val="200000"/>
+                <a:spcPct val="150000"/>
               </a:lnSpc>
             </a:pPr>
             <a:r>
@@ -21864,24 +21834,48 @@
           <a:p>
             <a:pPr>
               <a:lnSpc>
-                <a:spcPct val="200000"/>
+                <a:spcPct val="150000"/>
               </a:lnSpc>
             </a:pPr>
             <a:r>
               <a:rPr lang="fr-FR" dirty="0" smtClean="0"/>
-              <a:t>Chat de chaque partie dissociée du chat général</a:t>
+              <a:t>Chat de chaque partie </a:t>
+            </a:r>
+            <a:r>
+              <a:rPr lang="fr-FR" dirty="0" smtClean="0"/>
+              <a:t>dissocié </a:t>
+            </a:r>
+            <a:r>
+              <a:rPr lang="fr-FR" dirty="0" smtClean="0"/>
+              <a:t>du chat général</a:t>
             </a:r>
           </a:p>
           <a:p>
             <a:pPr>
               <a:lnSpc>
-                <a:spcPct val="200000"/>
+                <a:spcPct val="150000"/>
               </a:lnSpc>
             </a:pPr>
             <a:r>
               <a:rPr lang="fr-FR" dirty="0" smtClean="0"/>
-              <a:t>Plateau amélioré</a:t>
+              <a:t>Plateau </a:t>
             </a:r>
+            <a:r>
+              <a:rPr lang="fr-FR" dirty="0" smtClean="0"/>
+              <a:t>amélioré</a:t>
+            </a:r>
+          </a:p>
+          <a:p>
+            <a:pPr>
+              <a:lnSpc>
+                <a:spcPct val="150000"/>
+              </a:lnSpc>
+            </a:pPr>
+            <a:r>
+              <a:rPr lang="fr-FR" dirty="0" smtClean="0"/>
+              <a:t>Mode spectateur</a:t>
+            </a:r>
+            <a:endParaRPr lang="fr-FR" dirty="0" smtClean="0"/>
           </a:p>
         </p:txBody>
       </p:sp>
@@ -22158,7 +22152,15 @@
             </a:pPr>
             <a:r>
               <a:rPr lang="fr-FR" dirty="0" smtClean="0"/>
-              <a:t>Le moteur qui permet plusieurs affichages</a:t>
+              <a:t>Le </a:t>
+            </a:r>
+            <a:r>
+              <a:rPr lang="fr-FR" dirty="0" smtClean="0"/>
+              <a:t>moteur </a:t>
+            </a:r>
+            <a:r>
+              <a:rPr lang="fr-FR" dirty="0" smtClean="0"/>
+              <a:t>permet plusieurs affichages</a:t>
             </a:r>
           </a:p>
           <a:p>
@@ -23025,8 +23027,8 @@
               <a:t>Serveur avec un maximum de </a:t>
             </a:r>
             <a:r>
-              <a:rPr lang="fr-FR" dirty="0" err="1" smtClean="0"/>
-              <a:t>fonctionnalitées</a:t>
+              <a:rPr lang="fr-FR" dirty="0" smtClean="0"/>
+              <a:t>fonctionnalités</a:t>
             </a:r>
             <a:endParaRPr lang="fr-FR" dirty="0" smtClean="0"/>
           </a:p>
@@ -23271,8 +23273,13 @@
             </a:pPr>
             <a:r>
               <a:rPr lang="fr-FR" dirty="0" smtClean="0"/>
-              <a:t>La version déconnecté</a:t>
+              <a:t>La version </a:t>
             </a:r>
+            <a:r>
+              <a:rPr lang="fr-FR" dirty="0" smtClean="0"/>
+              <a:t>déconnectée</a:t>
+            </a:r>
+            <a:endParaRPr lang="fr-FR" dirty="0" smtClean="0"/>
           </a:p>
           <a:p>
             <a:pPr>
@@ -23282,7 +23289,11 @@
             </a:pPr>
             <a:r>
               <a:rPr lang="fr-FR" dirty="0" smtClean="0"/>
-              <a:t>Version avec d’autres types de connexions</a:t>
+              <a:t>Versions </a:t>
+            </a:r>
+            <a:r>
+              <a:rPr lang="fr-FR" dirty="0" smtClean="0"/>
+              <a:t>avec d’autres types de connexions</a:t>
             </a:r>
           </a:p>
         </p:txBody>
@@ -24308,7 +24319,23 @@
           <a:p>
             <a:r>
               <a:rPr lang="fr-FR" dirty="0" smtClean="0"/>
-              <a:t>Deux serveurs (java et web) sur la VM</a:t>
+              <a:t>Deux serveurs </a:t>
+            </a:r>
+            <a:r>
+              <a:rPr lang="fr-FR" dirty="0" smtClean="0"/>
+              <a:t>(Java </a:t>
+            </a:r>
+            <a:r>
+              <a:rPr lang="fr-FR" dirty="0" smtClean="0"/>
+              <a:t>et </a:t>
+            </a:r>
+            <a:r>
+              <a:rPr lang="fr-FR" dirty="0" smtClean="0"/>
+              <a:t>Web</a:t>
+            </a:r>
+            <a:r>
+              <a:rPr lang="fr-FR" dirty="0" smtClean="0"/>
+              <a:t>) sur la VM</a:t>
             </a:r>
             <a:endParaRPr lang="fr-FR" dirty="0"/>
           </a:p>
@@ -27806,7 +27833,7 @@
   <a:extraClrSchemeLst/>
   <a:extLst>
     <a:ext uri="{05A4C25C-085E-4340-85A3-A5531E510DB2}">
-      <thm15:themeFamily xmlns="" xmlns:thm15="http://schemas.microsoft.com/office/thememl/2012/main" name="Office Theme" id="{62F939B6-93AF-4DB8-9C6B-D6C7DFDC589F}" vid="{4A3C46E8-61CC-4603-A589-7422A47A8E4A}"/>
+      <thm15:themeFamily xmlns:thm15="http://schemas.microsoft.com/office/thememl/2012/main" xmlns="" name="Office Theme" id="{62F939B6-93AF-4DB8-9C6B-D6C7DFDC589F}" vid="{4A3C46E8-61CC-4603-A589-7422A47A8E4A}"/>
     </a:ext>
   </a:extLst>
 </a:theme>

</xml_diff>